<commit_message>
upload new html layout dropdown menu for predictors
</commit_message>
<xml_diff>
--- a/Marketing Response Analysis.pptx
+++ b/Marketing Response Analysis.pptx
@@ -224,7 +224,7 @@
           <a:p>
             <a:fld id="{73B2889B-A0AC-4482-8592-5C96F2309420}" type="datetimeFigureOut">
               <a:rPr lang="en-US" smtClean="0"/>
-              <a:t>10/27/2019</a:t>
+              <a:t>11/5/2019</a:t>
             </a:fld>
             <a:endParaRPr lang="en-US"/>
           </a:p>
@@ -401,7 +401,7 @@
           <a:p>
             <a:fld id="{830EB223-FFC0-462A-A3B8-EAA7CE0F8CBD}" type="datetimeFigureOut">
               <a:rPr lang="en-US" smtClean="0"/>
-              <a:t>10/27/2019</a:t>
+              <a:t>11/5/2019</a:t>
             </a:fld>
             <a:endParaRPr lang="en-US" dirty="0"/>
           </a:p>
@@ -2440,7 +2440,7 @@
           <a:p>
             <a:fld id="{DECF21A4-E71B-4D3A-AF45-E989C23A7BB1}" type="datetimeFigureOut">
               <a:rPr lang="en-US" smtClean="0"/>
-              <a:t>10/27/2019</a:t>
+              <a:t>11/5/2019</a:t>
             </a:fld>
             <a:endParaRPr lang="en-US" dirty="0"/>
           </a:p>
@@ -2638,7 +2638,7 @@
           <a:p>
             <a:fld id="{DECF21A4-E71B-4D3A-AF45-E989C23A7BB1}" type="datetimeFigureOut">
               <a:rPr lang="en-US" smtClean="0"/>
-              <a:t>10/27/2019</a:t>
+              <a:t>11/5/2019</a:t>
             </a:fld>
             <a:endParaRPr lang="en-US" dirty="0"/>
           </a:p>
@@ -2846,7 +2846,7 @@
           <a:p>
             <a:fld id="{DECF21A4-E71B-4D3A-AF45-E989C23A7BB1}" type="datetimeFigureOut">
               <a:rPr lang="en-US" smtClean="0"/>
-              <a:t>10/27/2019</a:t>
+              <a:t>11/5/2019</a:t>
             </a:fld>
             <a:endParaRPr lang="en-US" dirty="0"/>
           </a:p>
@@ -3044,7 +3044,7 @@
           <a:p>
             <a:fld id="{DECF21A4-E71B-4D3A-AF45-E989C23A7BB1}" type="datetimeFigureOut">
               <a:rPr lang="en-US" smtClean="0"/>
-              <a:t>10/27/2019</a:t>
+              <a:t>11/5/2019</a:t>
             </a:fld>
             <a:endParaRPr lang="en-US" dirty="0"/>
           </a:p>
@@ -3319,7 +3319,7 @@
           <a:p>
             <a:fld id="{DECF21A4-E71B-4D3A-AF45-E989C23A7BB1}" type="datetimeFigureOut">
               <a:rPr lang="en-US" smtClean="0"/>
-              <a:t>10/27/2019</a:t>
+              <a:t>11/5/2019</a:t>
             </a:fld>
             <a:endParaRPr lang="en-US" dirty="0"/>
           </a:p>
@@ -3584,7 +3584,7 @@
           <a:p>
             <a:fld id="{DECF21A4-E71B-4D3A-AF45-E989C23A7BB1}" type="datetimeFigureOut">
               <a:rPr lang="en-US" smtClean="0"/>
-              <a:t>10/27/2019</a:t>
+              <a:t>11/5/2019</a:t>
             </a:fld>
             <a:endParaRPr lang="en-US" dirty="0"/>
           </a:p>
@@ -3996,7 +3996,7 @@
           <a:p>
             <a:fld id="{DECF21A4-E71B-4D3A-AF45-E989C23A7BB1}" type="datetimeFigureOut">
               <a:rPr lang="en-US" smtClean="0"/>
-              <a:t>10/27/2019</a:t>
+              <a:t>11/5/2019</a:t>
             </a:fld>
             <a:endParaRPr lang="en-US" dirty="0"/>
           </a:p>
@@ -4137,7 +4137,7 @@
           <a:p>
             <a:fld id="{DECF21A4-E71B-4D3A-AF45-E989C23A7BB1}" type="datetimeFigureOut">
               <a:rPr lang="en-US" smtClean="0"/>
-              <a:t>10/27/2019</a:t>
+              <a:t>11/5/2019</a:t>
             </a:fld>
             <a:endParaRPr lang="en-US" dirty="0"/>
           </a:p>
@@ -4250,7 +4250,7 @@
           <a:p>
             <a:fld id="{DECF21A4-E71B-4D3A-AF45-E989C23A7BB1}" type="datetimeFigureOut">
               <a:rPr lang="en-US" smtClean="0"/>
-              <a:t>10/27/2019</a:t>
+              <a:t>11/5/2019</a:t>
             </a:fld>
             <a:endParaRPr lang="en-US" dirty="0"/>
           </a:p>
@@ -4561,7 +4561,7 @@
           <a:p>
             <a:fld id="{DECF21A4-E71B-4D3A-AF45-E989C23A7BB1}" type="datetimeFigureOut">
               <a:rPr lang="en-US" smtClean="0"/>
-              <a:t>10/27/2019</a:t>
+              <a:t>11/5/2019</a:t>
             </a:fld>
             <a:endParaRPr lang="en-US" dirty="0"/>
           </a:p>
@@ -4853,7 +4853,7 @@
           <a:p>
             <a:fld id="{DECF21A4-E71B-4D3A-AF45-E989C23A7BB1}" type="datetimeFigureOut">
               <a:rPr lang="en-US" smtClean="0"/>
-              <a:t>10/27/2019</a:t>
+              <a:t>11/5/2019</a:t>
             </a:fld>
             <a:endParaRPr lang="en-US" dirty="0"/>
           </a:p>
@@ -5094,7 +5094,7 @@
           <a:p>
             <a:fld id="{DECF21A4-E71B-4D3A-AF45-E989C23A7BB1}" type="datetimeFigureOut">
               <a:rPr lang="en-US" smtClean="0"/>
-              <a:t>10/27/2019</a:t>
+              <a:t>11/5/2019</a:t>
             </a:fld>
             <a:endParaRPr lang="en-US" dirty="0"/>
           </a:p>
@@ -8005,21 +8005,7 @@
                 <a:latin typeface="Segoe UI" panose="020B0502040204020203" pitchFamily="34" charset="0"/>
                 <a:cs typeface="Segoe UI" panose="020B0502040204020203" pitchFamily="34" charset="0"/>
               </a:rPr>
-              <a:t>Locally build model using Google </a:t>
-            </a:r>
-            <a:r>
-              <a:rPr lang="en-US" sz="1600" dirty="0" err="1">
-                <a:latin typeface="Segoe UI" panose="020B0502040204020203" pitchFamily="34" charset="0"/>
-                <a:cs typeface="Segoe UI" panose="020B0502040204020203" pitchFamily="34" charset="0"/>
-              </a:rPr>
-              <a:t>CoLab</a:t>
-            </a:r>
-            <a:r>
-              <a:rPr lang="en-US" sz="1600" dirty="0">
-                <a:latin typeface="Segoe UI" panose="020B0502040204020203" pitchFamily="34" charset="0"/>
-                <a:cs typeface="Segoe UI" panose="020B0502040204020203" pitchFamily="34" charset="0"/>
-              </a:rPr>
-              <a:t> and identifying highly weighted features for Azure ML model</a:t>
+              <a:t>Locally build model using Google CoLab and identifying highly weighted features for Azure ML model</a:t>
             </a:r>
           </a:p>
           <a:p>
@@ -8157,12 +8143,8 @@
           <a:p>
             <a:pPr algn="ctr"/>
             <a:r>
-              <a:rPr lang="en-US" dirty="0" err="1"/>
-              <a:t>CoLab</a:t>
-            </a:r>
-            <a:r>
               <a:rPr lang="en-US" dirty="0"/>
-              <a:t> </a:t>
+              <a:t>CoLab, Python </a:t>
             </a:r>
           </a:p>
           <a:p>
@@ -8369,8 +8351,8 @@
         </p:nvSpPr>
         <p:spPr>
           <a:xfrm>
-            <a:off x="6437812" y="4656907"/>
-            <a:ext cx="1510146" cy="1130531"/>
+            <a:off x="6437811" y="4656907"/>
+            <a:ext cx="1606451" cy="1130531"/>
           </a:xfrm>
           <a:prstGeom prst="ellipse">
             <a:avLst/>
@@ -8407,7 +8389,7 @@
             <a:pPr algn="ctr"/>
             <a:r>
               <a:rPr lang="en-US" dirty="0"/>
-              <a:t>Flask</a:t>
+              <a:t>Serverless Flask</a:t>
             </a:r>
           </a:p>
           <a:p>
@@ -8475,13 +8457,8 @@
             <a:pPr algn="ctr"/>
             <a:r>
               <a:rPr lang="en-US" dirty="0"/>
-              <a:t>HTML, CSS, </a:t>
-            </a:r>
-            <a:r>
-              <a:rPr lang="en-US" dirty="0" err="1"/>
-              <a:t>BootStrap</a:t>
-            </a:r>
-            <a:endParaRPr lang="en-US" dirty="0"/>
+              <a:t>HTML, CSS, JS BootStrap</a:t>
+            </a:r>
           </a:p>
         </p:txBody>
       </p:sp>
@@ -9935,7 +9912,7 @@
                     <a:p>
                       <a:pPr algn="ctr" fontAlgn="ctr"/>
                       <a:r>
-                        <a:rPr lang="en-US" sz="1100" b="0" i="0" u="none" strike="noStrike">
+                        <a:rPr lang="en-US" sz="1100" b="0" i="0" u="none" strike="noStrike" dirty="0">
                           <a:solidFill>
                             <a:srgbClr val="000000"/>
                           </a:solidFill>

</xml_diff>